<commit_message>
Fixed minor issues with "02. Conditional Statements - Advanced *"
</commit_message>
<xml_diff>
--- a/Courses/Software-Sciences/Module-1-OOP-New/02-Conditional-Statements-Advanced/02-Conditional-Statements-Advanced.pptx
+++ b/Courses/Software-Sciences/Module-1-OOP-New/02-Conditional-Statements-Advanced/02-Conditional-Statements-Advanced.pptx
@@ -301,7 +301,7 @@
           <a:p>
             <a:fld id="{4E087215-0C8F-4762-A664-737A353EC9A4}" type="datetimeFigureOut">
               <a:rPr lang="bg-BG" smtClean="0"/>
-              <a:t>22.12.22 г.</a:t>
+              <a:t>3.01.23 г.</a:t>
             </a:fld>
             <a:endParaRPr lang="bg-BG"/>
           </a:p>
@@ -492,7 +492,7 @@
           <a:p>
             <a:fld id="{72D84649-876A-46C9-8472-14CB09C070D8}" type="datetimeFigureOut">
               <a:rPr lang="en-US" smtClean="0"/>
-              <a:t>12/22/22</a:t>
+              <a:t>1/3/23</a:t>
             </a:fld>
             <a:endParaRPr lang="en-US"/>
           </a:p>
@@ -11131,7 +11131,7 @@
             </a:r>
             <a:r>
               <a:rPr lang="bg-BG" sz="1999" dirty="0"/>
-              <a:t>решението в </a:t>
+              <a:t>решението си в </a:t>
             </a:r>
             <a:r>
               <a:rPr lang="en-US" sz="1999" dirty="0"/>
@@ -16252,7 +16252,7 @@
             </a:r>
             <a:r>
               <a:rPr lang="bg-BG" sz="1999" dirty="0"/>
-              <a:t>решението в </a:t>
+              <a:t>решението си в </a:t>
             </a:r>
             <a:r>
               <a:rPr lang="en-US" sz="1999" dirty="0"/>
@@ -18103,7 +18103,15 @@
             <a:pPr lvl="1"/>
             <a:r>
               <a:rPr lang="bg-BG" sz="3000" dirty="0"/>
-              <a:t>&amp;&amp; - „и“</a:t>
+              <a:t>&amp;&amp; - </a:t>
+            </a:r>
+            <a:r>
+              <a:rPr lang="en-US" sz="3000" dirty="0"/>
+              <a:t>“</a:t>
+            </a:r>
+            <a:r>
+              <a:rPr lang="bg-BG" sz="3000" dirty="0"/>
+              <a:t>и“</a:t>
             </a:r>
           </a:p>
           <a:p>
@@ -18121,7 +18129,7 @@
             <a:pPr lvl="1"/>
             <a:r>
               <a:rPr lang="en-US" sz="3000" dirty="0"/>
-              <a:t>! – </a:t>
+              <a:t>! - </a:t>
             </a:r>
             <a:r>
               <a:rPr lang="bg-BG" sz="3000" dirty="0"/>
@@ -21025,7 +21033,7 @@
             </a:r>
             <a:r>
               <a:rPr lang="bg-BG" sz="1999" dirty="0"/>
-              <a:t>решението в </a:t>
+              <a:t>решението си в </a:t>
             </a:r>
             <a:r>
               <a:rPr lang="en-US" sz="1999" dirty="0"/>
@@ -23305,7 +23313,7 @@
             </a:r>
             <a:r>
               <a:rPr lang="bg-BG" sz="1999" dirty="0"/>
-              <a:t>решението в </a:t>
+              <a:t>решението си в </a:t>
             </a:r>
             <a:r>
               <a:rPr lang="en-US" sz="1999" dirty="0"/>
@@ -23674,11 +23682,11 @@
   <p:clrMapOvr>
     <a:masterClrMapping/>
   </p:clrMapOvr>
-  <mc:AlternateContent xmlns:mc="http://schemas.openxmlformats.org/markup-compatibility/2006">
-    <mc:Choice xmlns:p14="http://schemas.microsoft.com/office/powerpoint/2010/main" Requires="p14">
+  <mc:AlternateContent xmlns:mc="http://schemas.openxmlformats.org/markup-compatibility/2006" xmlns:p14="http://schemas.microsoft.com/office/powerpoint/2010/main">
+    <mc:Choice Requires="p14">
       <p:transition p14:dur="0"/>
     </mc:Choice>
-    <mc:Fallback>
+    <mc:Fallback xmlns="">
       <p:transition/>
     </mc:Fallback>
   </mc:AlternateContent>
@@ -25337,39 +25345,26 @@
                                   </p:childTnLst>
                                 </p:cTn>
                               </p:par>
+                            </p:childTnLst>
+                          </p:cTn>
+                        </p:par>
+                      </p:childTnLst>
+                    </p:cTn>
+                  </p:par>
+                  <p:par>
+                    <p:cTn id="9" fill="hold">
+                      <p:stCondLst>
+                        <p:cond delay="indefinite"/>
+                      </p:stCondLst>
+                      <p:childTnLst>
+                        <p:par>
+                          <p:cTn id="10" fill="hold">
+                            <p:stCondLst>
+                              <p:cond delay="0"/>
+                            </p:stCondLst>
+                            <p:childTnLst>
                               <p:par>
-                                <p:cTn id="9" presetID="1" presetClass="entr" presetSubtype="0" fill="hold" nodeType="withEffect">
-                                  <p:stCondLst>
-                                    <p:cond delay="0"/>
-                                  </p:stCondLst>
-                                  <p:childTnLst>
-                                    <p:set>
-                                      <p:cBhvr>
-                                        <p:cTn id="10" dur="1" fill="hold">
-                                          <p:stCondLst>
-                                            <p:cond delay="0"/>
-                                          </p:stCondLst>
-                                        </p:cTn>
-                                        <p:tgtEl>
-                                          <p:spTgt spid="15">
-                                            <p:txEl>
-                                              <p:pRg st="3" end="3"/>
-                                            </p:txEl>
-                                          </p:spTgt>
-                                        </p:tgtEl>
-                                        <p:attrNameLst>
-                                          <p:attrName>style.visibility</p:attrName>
-                                        </p:attrNameLst>
-                                      </p:cBhvr>
-                                      <p:to>
-                                        <p:strVal val="visible"/>
-                                      </p:to>
-                                    </p:set>
-                                  </p:childTnLst>
-                                </p:cTn>
-                              </p:par>
-                              <p:par>
-                                <p:cTn id="11" presetID="1" presetClass="entr" presetSubtype="0" fill="hold" nodeType="withEffect">
+                                <p:cTn id="11" presetID="1" presetClass="entr" presetSubtype="0" fill="hold" nodeType="clickEffect">
                                   <p:stCondLst>
                                     <p:cond delay="0"/>
                                   </p:stCondLst>
@@ -25384,7 +25379,7 @@
                                         <p:tgtEl>
                                           <p:spTgt spid="15">
                                             <p:txEl>
-                                              <p:pRg st="4" end="4"/>
+                                              <p:pRg st="3" end="3"/>
                                             </p:txEl>
                                           </p:spTgt>
                                         </p:tgtEl>
@@ -25426,6 +25421,55 @@
                                     <p:set>
                                       <p:cBhvr>
                                         <p:cTn id="16" dur="1" fill="hold">
+                                          <p:stCondLst>
+                                            <p:cond delay="0"/>
+                                          </p:stCondLst>
+                                        </p:cTn>
+                                        <p:tgtEl>
+                                          <p:spTgt spid="15">
+                                            <p:txEl>
+                                              <p:pRg st="4" end="4"/>
+                                            </p:txEl>
+                                          </p:spTgt>
+                                        </p:tgtEl>
+                                        <p:attrNameLst>
+                                          <p:attrName>style.visibility</p:attrName>
+                                        </p:attrNameLst>
+                                      </p:cBhvr>
+                                      <p:to>
+                                        <p:strVal val="visible"/>
+                                      </p:to>
+                                    </p:set>
+                                  </p:childTnLst>
+                                </p:cTn>
+                              </p:par>
+                            </p:childTnLst>
+                          </p:cTn>
+                        </p:par>
+                      </p:childTnLst>
+                    </p:cTn>
+                  </p:par>
+                  <p:par>
+                    <p:cTn id="17" fill="hold">
+                      <p:stCondLst>
+                        <p:cond delay="indefinite"/>
+                      </p:stCondLst>
+                      <p:childTnLst>
+                        <p:par>
+                          <p:cTn id="18" fill="hold">
+                            <p:stCondLst>
+                              <p:cond delay="0"/>
+                            </p:stCondLst>
+                            <p:childTnLst>
+                              <p:par>
+                                <p:cTn id="19" presetID="1" presetClass="entr" presetSubtype="0" fill="hold" nodeType="clickEffect">
+                                  <p:stCondLst>
+                                    <p:cond delay="0"/>
+                                  </p:stCondLst>
+                                  <p:childTnLst>
+                                    <p:set>
+                                      <p:cBhvr>
+                                        <p:cTn id="20" dur="1" fill="hold">
                                           <p:stCondLst>
                                             <p:cond delay="0"/>
                                           </p:stCondLst>
@@ -30682,7 +30726,7 @@
             </a:r>
             <a:r>
               <a:rPr lang="bg-BG" sz="1999" dirty="0"/>
-              <a:t>решението в </a:t>
+              <a:t>решението си в </a:t>
             </a:r>
             <a:r>
               <a:rPr lang="en-US" sz="1999" dirty="0"/>

</xml_diff>

<commit_message>
Updated metadata for "02. Conditional Statements Advanced *"
</commit_message>
<xml_diff>
--- a/Courses/Software-Sciences/Module-1-OOP-New/02-Conditional-Statements-Advanced/02-Conditional-Statements-Advanced.pptx
+++ b/Courses/Software-Sciences/Module-1-OOP-New/02-Conditional-Statements-Advanced/02-Conditional-Statements-Advanced.pptx
@@ -301,7 +301,7 @@
           <a:p>
             <a:fld id="{4E087215-0C8F-4762-A664-737A353EC9A4}" type="datetimeFigureOut">
               <a:rPr lang="bg-BG" smtClean="0"/>
-              <a:t>3.01.23 г.</a:t>
+              <a:t>18.01.23 г.</a:t>
             </a:fld>
             <a:endParaRPr lang="bg-BG"/>
           </a:p>
@@ -492,7 +492,7 @@
           <a:p>
             <a:fld id="{72D84649-876A-46C9-8472-14CB09C070D8}" type="datetimeFigureOut">
               <a:rPr lang="en-US" smtClean="0"/>
-              <a:t>1/3/23</a:t>
+              <a:t>1/18/23</a:t>
             </a:fld>
             <a:endParaRPr lang="en-US"/>
           </a:p>

</xml_diff>